<commit_message>
updated designs + added Meetings directory
</commit_message>
<xml_diff>
--- a/Documentation/Screen Designs/Shanta Sanofi Screen Designs.pptx
+++ b/Documentation/Screen Designs/Shanta Sanofi Screen Designs.pptx
@@ -208,7 +208,7 @@
           <a:p>
             <a:fld id="{736940B7-5369-499F-A655-F2C040499C10}" type="datetimeFigureOut">
               <a:rPr lang="en-IN" smtClean="0"/>
-              <a:t>19/02/19</a:t>
+              <a:t>20/02/19</a:t>
             </a:fld>
             <a:endParaRPr lang="en-IN"/>
           </a:p>
@@ -1531,7 +1531,7 @@
           <a:p>
             <a:fld id="{0344983A-0EFF-4FA5-823C-58DD31D92387}" type="datetimeFigureOut">
               <a:rPr lang="en-IN" smtClean="0"/>
-              <a:t>19/02/19</a:t>
+              <a:t>20/02/19</a:t>
             </a:fld>
             <a:endParaRPr lang="en-IN"/>
           </a:p>
@@ -1701,7 +1701,7 @@
           <a:p>
             <a:fld id="{0344983A-0EFF-4FA5-823C-58DD31D92387}" type="datetimeFigureOut">
               <a:rPr lang="en-IN" smtClean="0"/>
-              <a:t>19/02/19</a:t>
+              <a:t>20/02/19</a:t>
             </a:fld>
             <a:endParaRPr lang="en-IN"/>
           </a:p>
@@ -1881,7 +1881,7 @@
           <a:p>
             <a:fld id="{0344983A-0EFF-4FA5-823C-58DD31D92387}" type="datetimeFigureOut">
               <a:rPr lang="en-IN" smtClean="0"/>
-              <a:t>19/02/19</a:t>
+              <a:t>20/02/19</a:t>
             </a:fld>
             <a:endParaRPr lang="en-IN"/>
           </a:p>
@@ -2051,7 +2051,7 @@
           <a:p>
             <a:fld id="{0344983A-0EFF-4FA5-823C-58DD31D92387}" type="datetimeFigureOut">
               <a:rPr lang="en-IN" smtClean="0"/>
-              <a:t>19/02/19</a:t>
+              <a:t>20/02/19</a:t>
             </a:fld>
             <a:endParaRPr lang="en-IN"/>
           </a:p>
@@ -2297,7 +2297,7 @@
           <a:p>
             <a:fld id="{0344983A-0EFF-4FA5-823C-58DD31D92387}" type="datetimeFigureOut">
               <a:rPr lang="en-IN" smtClean="0"/>
-              <a:t>19/02/19</a:t>
+              <a:t>20/02/19</a:t>
             </a:fld>
             <a:endParaRPr lang="en-IN"/>
           </a:p>
@@ -2529,7 +2529,7 @@
           <a:p>
             <a:fld id="{0344983A-0EFF-4FA5-823C-58DD31D92387}" type="datetimeFigureOut">
               <a:rPr lang="en-IN" smtClean="0"/>
-              <a:t>19/02/19</a:t>
+              <a:t>20/02/19</a:t>
             </a:fld>
             <a:endParaRPr lang="en-IN"/>
           </a:p>
@@ -2896,7 +2896,7 @@
           <a:p>
             <a:fld id="{0344983A-0EFF-4FA5-823C-58DD31D92387}" type="datetimeFigureOut">
               <a:rPr lang="en-IN" smtClean="0"/>
-              <a:t>19/02/19</a:t>
+              <a:t>20/02/19</a:t>
             </a:fld>
             <a:endParaRPr lang="en-IN"/>
           </a:p>
@@ -3014,7 +3014,7 @@
           <a:p>
             <a:fld id="{0344983A-0EFF-4FA5-823C-58DD31D92387}" type="datetimeFigureOut">
               <a:rPr lang="en-IN" smtClean="0"/>
-              <a:t>19/02/19</a:t>
+              <a:t>20/02/19</a:t>
             </a:fld>
             <a:endParaRPr lang="en-IN"/>
           </a:p>
@@ -3109,7 +3109,7 @@
           <a:p>
             <a:fld id="{0344983A-0EFF-4FA5-823C-58DD31D92387}" type="datetimeFigureOut">
               <a:rPr lang="en-IN" smtClean="0"/>
-              <a:t>19/02/19</a:t>
+              <a:t>20/02/19</a:t>
             </a:fld>
             <a:endParaRPr lang="en-IN"/>
           </a:p>
@@ -3386,7 +3386,7 @@
           <a:p>
             <a:fld id="{0344983A-0EFF-4FA5-823C-58DD31D92387}" type="datetimeFigureOut">
               <a:rPr lang="en-IN" smtClean="0"/>
-              <a:t>19/02/19</a:t>
+              <a:t>20/02/19</a:t>
             </a:fld>
             <a:endParaRPr lang="en-IN"/>
           </a:p>
@@ -3643,7 +3643,7 @@
           <a:p>
             <a:fld id="{0344983A-0EFF-4FA5-823C-58DD31D92387}" type="datetimeFigureOut">
               <a:rPr lang="en-IN" smtClean="0"/>
-              <a:t>19/02/19</a:t>
+              <a:t>20/02/19</a:t>
             </a:fld>
             <a:endParaRPr lang="en-IN"/>
           </a:p>
@@ -3856,7 +3856,7 @@
           <a:p>
             <a:fld id="{0344983A-0EFF-4FA5-823C-58DD31D92387}" type="datetimeFigureOut">
               <a:rPr lang="en-IN" smtClean="0"/>
-              <a:t>19/02/19</a:t>
+              <a:t>20/02/19</a:t>
             </a:fld>
             <a:endParaRPr lang="en-IN"/>
           </a:p>
@@ -11343,8 +11343,8 @@
         </p:nvSpPr>
         <p:spPr>
           <a:xfrm>
-            <a:off x="4025321" y="3406590"/>
-            <a:ext cx="1294522" cy="369332"/>
+            <a:off x="3496909" y="3406590"/>
+            <a:ext cx="2351349" cy="369332"/>
           </a:xfrm>
           <a:prstGeom prst="rect">
             <a:avLst/>
@@ -11360,7 +11360,7 @@
             <a:pPr algn="ctr"/>
             <a:r>
               <a:rPr lang="en-US" dirty="0"/>
-              <a:t>Start Date *</a:t>
+              <a:t>Course Addition Date *</a:t>
             </a:r>
           </a:p>
         </p:txBody>
@@ -11515,7 +11515,7 @@
         </p:nvSpPr>
         <p:spPr>
           <a:xfrm>
-            <a:off x="9192225" y="4459220"/>
+            <a:off x="9212545" y="4459220"/>
             <a:ext cx="1813374" cy="443272"/>
           </a:xfrm>
           <a:prstGeom prst="roundRect">
@@ -11555,10 +11555,9 @@
           <a:p>
             <a:pPr algn="ctr"/>
             <a:r>
-              <a:rPr lang="en-IN" sz="1646" dirty="0" err="1"/>
-              <a:t>nter</a:t>
+              <a:rPr lang="en-IN" sz="1646" dirty="0"/>
+              <a:t>Enter</a:t>
             </a:r>
-            <a:endParaRPr lang="en-IN" sz="1646" dirty="0"/>
           </a:p>
         </p:txBody>
       </p:sp>
@@ -11576,8 +11575,8 @@
         </p:nvSpPr>
         <p:spPr>
           <a:xfrm>
-            <a:off x="4128907" y="4533160"/>
-            <a:ext cx="1087349" cy="369332"/>
+            <a:off x="4111596" y="4533160"/>
+            <a:ext cx="1121974" cy="369332"/>
           </a:xfrm>
           <a:prstGeom prst="rect">
             <a:avLst/>
@@ -11593,7 +11592,7 @@
             <a:pPr algn="ctr"/>
             <a:r>
               <a:rPr lang="en-US" dirty="0"/>
-              <a:t>End Date </a:t>
+              <a:t>Duration*</a:t>
             </a:r>
           </a:p>
         </p:txBody>
@@ -13103,36 +13102,6 @@
           </a:p>
         </p:txBody>
       </p:sp>
-      <p:pic>
-        <p:nvPicPr>
-          <p:cNvPr id="40" name="Picture 39">
-            <a:extLst>
-              <a:ext uri="{FF2B5EF4-FFF2-40B4-BE49-F238E27FC236}">
-                <a16:creationId xmlns:a16="http://schemas.microsoft.com/office/drawing/2014/main" id="{25AD6FF2-6DC2-9342-A298-C73A156A7691}"/>
-              </a:ext>
-            </a:extLst>
-          </p:cNvPr>
-          <p:cNvPicPr>
-            <a:picLocks noChangeAspect="1"/>
-          </p:cNvPicPr>
-          <p:nvPr/>
-        </p:nvPicPr>
-        <p:blipFill>
-          <a:blip r:embed="rId11"/>
-          <a:stretch>
-            <a:fillRect/>
-          </a:stretch>
-        </p:blipFill>
-        <p:spPr>
-          <a:xfrm>
-            <a:off x="7692566" y="7755222"/>
-            <a:ext cx="10136484" cy="5597102"/>
-          </a:xfrm>
-          <a:prstGeom prst="rect">
-            <a:avLst/>
-          </a:prstGeom>
-        </p:spPr>
-      </p:pic>
       <p:sp>
         <p:nvSpPr>
           <p:cNvPr id="2" name="TextBox 1">
@@ -13247,7 +13216,7 @@
         <p:spPr>
           <a:xfrm>
             <a:off x="6357748" y="1979238"/>
-            <a:ext cx="1130804" cy="430662"/>
+            <a:ext cx="1394612" cy="430662"/>
           </a:xfrm>
           <a:prstGeom prst="roundRect">
             <a:avLst/>
@@ -13283,13 +13252,16 @@
           <a:bodyPr rtlCol="0" anchor="ctr"/>
           <a:lstStyle/>
           <a:p>
-            <a:endParaRPr lang="en-IN" sz="1646" dirty="0">
-              <a:solidFill>
-                <a:schemeClr val="bg2">
-                  <a:lumMod val="50000"/>
-                </a:schemeClr>
-              </a:solidFill>
-            </a:endParaRPr>
+            <a:r>
+              <a:rPr lang="en-IN" sz="1646" dirty="0">
+                <a:solidFill>
+                  <a:schemeClr val="bg2">
+                    <a:lumMod val="50000"/>
+                  </a:schemeClr>
+                </a:solidFill>
+              </a:rPr>
+              <a:t>today</a:t>
+            </a:r>
           </a:p>
         </p:txBody>
       </p:sp>
@@ -13331,46 +13303,10 @@
       </p:sp>
       <p:sp>
         <p:nvSpPr>
-          <p:cNvPr id="46" name="TextBox 45">
-            <a:extLst>
-              <a:ext uri="{FF2B5EF4-FFF2-40B4-BE49-F238E27FC236}">
-                <a16:creationId xmlns:a16="http://schemas.microsoft.com/office/drawing/2014/main" id="{21A65F48-94AD-7449-B09D-FDB97C9B906F}"/>
-              </a:ext>
-            </a:extLst>
-          </p:cNvPr>
-          <p:cNvSpPr txBox="1"/>
-          <p:nvPr/>
-        </p:nvSpPr>
-        <p:spPr>
-          <a:xfrm>
-            <a:off x="7589365" y="2009903"/>
-            <a:ext cx="1303766" cy="369332"/>
-          </a:xfrm>
-          <a:prstGeom prst="rect">
-            <a:avLst/>
-          </a:prstGeom>
-          <a:noFill/>
-        </p:spPr>
-        <p:txBody>
-          <a:bodyPr wrap="square" rtlCol="0">
-            <a:spAutoFit/>
-          </a:bodyPr>
-          <a:lstStyle/>
-          <a:p>
-            <a:pPr algn="ctr"/>
-            <a:r>
-              <a:rPr lang="en-US" dirty="0"/>
-              <a:t>End Date </a:t>
-            </a:r>
-          </a:p>
-        </p:txBody>
-      </p:sp>
-      <p:sp>
-        <p:nvSpPr>
-          <p:cNvPr id="48" name="Rectangle: Rounded Corners 55">
-            <a:extLst>
-              <a:ext uri="{FF2B5EF4-FFF2-40B4-BE49-F238E27FC236}">
-                <a16:creationId xmlns:a16="http://schemas.microsoft.com/office/drawing/2014/main" id="{1A549288-70C2-FA4A-B20B-0E47D8136C14}"/>
+          <p:cNvPr id="49" name="Rectangle: Rounded Corners 65">
+            <a:extLst>
+              <a:ext uri="{FF2B5EF4-FFF2-40B4-BE49-F238E27FC236}">
+                <a16:creationId xmlns:a16="http://schemas.microsoft.com/office/drawing/2014/main" id="{05EAECDE-3B6D-E24E-8243-B8611089B202}"/>
               </a:ext>
             </a:extLst>
           </p:cNvPr>
@@ -13379,19 +13315,20 @@
         </p:nvSpPr>
         <p:spPr>
           <a:xfrm>
-            <a:off x="8905050" y="2003633"/>
-            <a:ext cx="1130804" cy="430662"/>
+            <a:off x="6075616" y="6406408"/>
+            <a:ext cx="1813374" cy="443272"/>
           </a:xfrm>
           <a:prstGeom prst="roundRect">
             <a:avLst/>
           </a:prstGeom>
           <a:solidFill>
-            <a:schemeClr val="bg1"/>
+            <a:srgbClr val="00B0F0"/>
           </a:solidFill>
           <a:ln>
             <a:solidFill>
-              <a:schemeClr val="bg2">
-                <a:lumMod val="50000"/>
+              <a:schemeClr val="accent1">
+                <a:lumMod val="60000"/>
+                <a:lumOff val="40000"/>
               </a:schemeClr>
             </a:solidFill>
           </a:ln>
@@ -13416,22 +13353,221 @@
           <a:bodyPr rtlCol="0" anchor="ctr"/>
           <a:lstStyle/>
           <a:p>
-            <a:endParaRPr lang="en-IN" sz="1646" dirty="0">
-              <a:solidFill>
-                <a:schemeClr val="bg2">
-                  <a:lumMod val="50000"/>
-                </a:schemeClr>
-              </a:solidFill>
-            </a:endParaRPr>
-          </a:p>
-        </p:txBody>
-      </p:sp>
-      <p:sp>
-        <p:nvSpPr>
-          <p:cNvPr id="49" name="Rectangle: Rounded Corners 65">
-            <a:extLst>
-              <a:ext uri="{FF2B5EF4-FFF2-40B4-BE49-F238E27FC236}">
-                <a16:creationId xmlns:a16="http://schemas.microsoft.com/office/drawing/2014/main" id="{05EAECDE-3B6D-E24E-8243-B8611089B202}"/>
+            <a:pPr algn="ctr"/>
+            <a:r>
+              <a:rPr lang="en-IN" sz="1646" dirty="0"/>
+              <a:t>Submit</a:t>
+            </a:r>
+          </a:p>
+        </p:txBody>
+      </p:sp>
+      <p:pic>
+        <p:nvPicPr>
+          <p:cNvPr id="5" name="Picture 4"/>
+          <p:cNvPicPr>
+            <a:picLocks noChangeAspect="1"/>
+          </p:cNvPicPr>
+          <p:nvPr/>
+        </p:nvPicPr>
+        <p:blipFill>
+          <a:blip r:embed="rId11"/>
+          <a:stretch>
+            <a:fillRect/>
+          </a:stretch>
+        </p:blipFill>
+        <p:spPr>
+          <a:xfrm>
+            <a:off x="8729072" y="2644343"/>
+            <a:ext cx="3240968" cy="466725"/>
+          </a:xfrm>
+          <a:prstGeom prst="rect">
+            <a:avLst/>
+          </a:prstGeom>
+        </p:spPr>
+      </p:pic>
+      <p:sp>
+        <p:nvSpPr>
+          <p:cNvPr id="52" name="TextBox 51">
+            <a:extLst>
+              <a:ext uri="{FF2B5EF4-FFF2-40B4-BE49-F238E27FC236}">
+                <a16:creationId xmlns:a16="http://schemas.microsoft.com/office/drawing/2014/main" id="{550105AF-B118-154C-AF9F-5CD4F3909DD9}"/>
+              </a:ext>
+            </a:extLst>
+          </p:cNvPr>
+          <p:cNvSpPr txBox="1"/>
+          <p:nvPr/>
+        </p:nvSpPr>
+        <p:spPr>
+          <a:xfrm>
+            <a:off x="7496591" y="2691138"/>
+            <a:ext cx="1448720" cy="369332"/>
+          </a:xfrm>
+          <a:prstGeom prst="rect">
+            <a:avLst/>
+          </a:prstGeom>
+          <a:noFill/>
+        </p:spPr>
+        <p:txBody>
+          <a:bodyPr wrap="square" rtlCol="0">
+            <a:spAutoFit/>
+          </a:bodyPr>
+          <a:lstStyle/>
+          <a:p>
+            <a:pPr algn="ctr"/>
+            <a:r>
+              <a:rPr lang="en-US" dirty="0"/>
+              <a:t>Filter </a:t>
+            </a:r>
+          </a:p>
+        </p:txBody>
+      </p:sp>
+      <p:pic>
+        <p:nvPicPr>
+          <p:cNvPr id="7" name="Picture 6"/>
+          <p:cNvPicPr>
+            <a:picLocks noChangeAspect="1"/>
+          </p:cNvPicPr>
+          <p:nvPr/>
+        </p:nvPicPr>
+        <p:blipFill>
+          <a:blip r:embed="rId12"/>
+          <a:stretch>
+            <a:fillRect/>
+          </a:stretch>
+        </p:blipFill>
+        <p:spPr>
+          <a:xfrm>
+            <a:off x="3257340" y="3182601"/>
+            <a:ext cx="8706761" cy="2809852"/>
+          </a:xfrm>
+          <a:prstGeom prst="rect">
+            <a:avLst/>
+          </a:prstGeom>
+        </p:spPr>
+      </p:pic>
+      <p:pic>
+        <p:nvPicPr>
+          <p:cNvPr id="8" name="Picture 7"/>
+          <p:cNvPicPr>
+            <a:picLocks noChangeAspect="1"/>
+          </p:cNvPicPr>
+          <p:nvPr/>
+        </p:nvPicPr>
+        <p:blipFill rotWithShape="1">
+          <a:blip r:embed="rId13"/>
+          <a:srcRect r="9276" b="-318"/>
+          <a:stretch/>
+        </p:blipFill>
+        <p:spPr>
+          <a:xfrm>
+            <a:off x="2949113" y="3853394"/>
+            <a:ext cx="336879" cy="2173261"/>
+          </a:xfrm>
+          <a:prstGeom prst="rect">
+            <a:avLst/>
+          </a:prstGeom>
+        </p:spPr>
+      </p:pic>
+      <p:pic>
+        <p:nvPicPr>
+          <p:cNvPr id="53" name="Picture 52">
+            <a:extLst>
+              <a:ext uri="{FF2B5EF4-FFF2-40B4-BE49-F238E27FC236}">
+                <a16:creationId xmlns:a16="http://schemas.microsoft.com/office/drawing/2014/main" id="{D61881A4-B9B7-EA4D-A8C2-F7D2F176BD1B}"/>
+              </a:ext>
+            </a:extLst>
+          </p:cNvPr>
+          <p:cNvPicPr>
+            <a:picLocks noChangeAspect="1"/>
+          </p:cNvPicPr>
+          <p:nvPr/>
+        </p:nvPicPr>
+        <p:blipFill rotWithShape="1">
+          <a:blip r:embed="rId12"/>
+          <a:srcRect l="11986" r="79135" b="83150"/>
+          <a:stretch/>
+        </p:blipFill>
+        <p:spPr>
+          <a:xfrm>
+            <a:off x="2949113" y="3185476"/>
+            <a:ext cx="342738" cy="667918"/>
+          </a:xfrm>
+          <a:prstGeom prst="rect">
+            <a:avLst/>
+          </a:prstGeom>
+        </p:spPr>
+      </p:pic>
+      <p:pic>
+        <p:nvPicPr>
+          <p:cNvPr id="3" name="Picture 2">
+            <a:extLst>
+              <a:ext uri="{FF2B5EF4-FFF2-40B4-BE49-F238E27FC236}">
+                <a16:creationId xmlns:a16="http://schemas.microsoft.com/office/drawing/2014/main" id="{70479DC5-6CE0-734B-B5A7-135785E432A2}"/>
+              </a:ext>
+            </a:extLst>
+          </p:cNvPr>
+          <p:cNvPicPr>
+            <a:picLocks noChangeAspect="1"/>
+          </p:cNvPicPr>
+          <p:nvPr/>
+        </p:nvPicPr>
+        <p:blipFill>
+          <a:blip r:embed="rId14"/>
+          <a:stretch>
+            <a:fillRect/>
+          </a:stretch>
+        </p:blipFill>
+        <p:spPr>
+          <a:xfrm>
+            <a:off x="3137578" y="1915226"/>
+            <a:ext cx="1570631" cy="566040"/>
+          </a:xfrm>
+          <a:prstGeom prst="rect">
+            <a:avLst/>
+          </a:prstGeom>
+        </p:spPr>
+      </p:pic>
+      <p:sp>
+        <p:nvSpPr>
+          <p:cNvPr id="4" name="TextBox 3">
+            <a:extLst>
+              <a:ext uri="{FF2B5EF4-FFF2-40B4-BE49-F238E27FC236}">
+                <a16:creationId xmlns:a16="http://schemas.microsoft.com/office/drawing/2014/main" id="{31B0AC37-3F7A-574E-B86E-E42341BD8CDE}"/>
+              </a:ext>
+            </a:extLst>
+          </p:cNvPr>
+          <p:cNvSpPr txBox="1"/>
+          <p:nvPr/>
+        </p:nvSpPr>
+        <p:spPr>
+          <a:xfrm>
+            <a:off x="2891548" y="2706755"/>
+            <a:ext cx="1789849" cy="369332"/>
+          </a:xfrm>
+          <a:prstGeom prst="rect">
+            <a:avLst/>
+          </a:prstGeom>
+          <a:noFill/>
+        </p:spPr>
+        <p:txBody>
+          <a:bodyPr wrap="none" rtlCol="0">
+            <a:spAutoFit/>
+          </a:bodyPr>
+          <a:lstStyle/>
+          <a:p>
+            <a:r>
+              <a:rPr lang="en-US" dirty="0"/>
+              <a:t>Search Employee</a:t>
+            </a:r>
+          </a:p>
+        </p:txBody>
+      </p:sp>
+      <p:sp>
+        <p:nvSpPr>
+          <p:cNvPr id="55" name="Rectangle: Rounded Corners 55">
+            <a:extLst>
+              <a:ext uri="{FF2B5EF4-FFF2-40B4-BE49-F238E27FC236}">
+                <a16:creationId xmlns:a16="http://schemas.microsoft.com/office/drawing/2014/main" id="{418249F8-5E10-B842-80DF-833D2C21E785}"/>
               </a:ext>
             </a:extLst>
           </p:cNvPr>
@@ -13440,20 +13576,19 @@
         </p:nvSpPr>
         <p:spPr>
           <a:xfrm>
-            <a:off x="6075616" y="6406408"/>
-            <a:ext cx="1813374" cy="443272"/>
+            <a:off x="4714801" y="2650108"/>
+            <a:ext cx="1394612" cy="430662"/>
           </a:xfrm>
           <a:prstGeom prst="roundRect">
             <a:avLst/>
           </a:prstGeom>
           <a:solidFill>
-            <a:srgbClr val="00B0F0"/>
+            <a:schemeClr val="bg1"/>
           </a:solidFill>
           <a:ln>
             <a:solidFill>
-              <a:schemeClr val="accent1">
-                <a:lumMod val="60000"/>
-                <a:lumOff val="40000"/>
+              <a:schemeClr val="bg2">
+                <a:lumMod val="50000"/>
               </a:schemeClr>
             </a:solidFill>
           </a:ln>
@@ -13478,180 +13613,54 @@
           <a:bodyPr rtlCol="0" anchor="ctr"/>
           <a:lstStyle/>
           <a:p>
-            <a:pPr algn="ctr"/>
             <a:r>
-              <a:rPr lang="en-IN" sz="1646" dirty="0"/>
-              <a:t>Submit</a:t>
+              <a:rPr lang="en-IN" sz="1646" dirty="0">
+                <a:solidFill>
+                  <a:schemeClr val="bg2">
+                    <a:lumMod val="50000"/>
+                  </a:schemeClr>
+                </a:solidFill>
+              </a:rPr>
+              <a:t>Employee ID</a:t>
             </a:r>
           </a:p>
         </p:txBody>
       </p:sp>
-      <p:pic>
-        <p:nvPicPr>
-          <p:cNvPr id="5" name="Picture 4"/>
-          <p:cNvPicPr>
-            <a:picLocks noChangeAspect="1"/>
-          </p:cNvPicPr>
-          <p:nvPr/>
-        </p:nvPicPr>
-        <p:blipFill>
-          <a:blip r:embed="rId12"/>
-          <a:stretch>
-            <a:fillRect/>
-          </a:stretch>
-        </p:blipFill>
-        <p:spPr>
-          <a:xfrm>
-            <a:off x="8719601" y="2606000"/>
-            <a:ext cx="3240968" cy="466725"/>
+      <p:sp>
+        <p:nvSpPr>
+          <p:cNvPr id="10" name="TextBox 9">
+            <a:extLst>
+              <a:ext uri="{FF2B5EF4-FFF2-40B4-BE49-F238E27FC236}">
+                <a16:creationId xmlns:a16="http://schemas.microsoft.com/office/drawing/2014/main" id="{106AE7E5-B177-AD45-BE83-1EBAE8DBF6FA}"/>
+              </a:ext>
+            </a:extLst>
+          </p:cNvPr>
+          <p:cNvSpPr txBox="1"/>
+          <p:nvPr/>
+        </p:nvSpPr>
+        <p:spPr>
+          <a:xfrm>
+            <a:off x="3497928" y="6097648"/>
+            <a:ext cx="830677" cy="369332"/>
           </a:xfrm>
           <a:prstGeom prst="rect">
             <a:avLst/>
           </a:prstGeom>
-        </p:spPr>
-      </p:pic>
-      <p:sp>
-        <p:nvSpPr>
-          <p:cNvPr id="52" name="TextBox 51">
-            <a:extLst>
-              <a:ext uri="{FF2B5EF4-FFF2-40B4-BE49-F238E27FC236}">
-                <a16:creationId xmlns:a16="http://schemas.microsoft.com/office/drawing/2014/main" id="{550105AF-B118-154C-AF9F-5CD4F3909DD9}"/>
-              </a:ext>
-            </a:extLst>
-          </p:cNvPr>
-          <p:cNvSpPr txBox="1"/>
-          <p:nvPr/>
-        </p:nvSpPr>
-        <p:spPr>
-          <a:xfrm>
-            <a:off x="7607188" y="2632201"/>
-            <a:ext cx="1448720" cy="369332"/>
-          </a:xfrm>
-          <a:prstGeom prst="rect">
-            <a:avLst/>
-          </a:prstGeom>
           <a:noFill/>
         </p:spPr>
         <p:txBody>
-          <a:bodyPr wrap="square" rtlCol="0">
+          <a:bodyPr wrap="none" rtlCol="0">
             <a:spAutoFit/>
           </a:bodyPr>
           <a:lstStyle/>
           <a:p>
-            <a:pPr algn="ctr"/>
             <a:r>
               <a:rPr lang="en-US" dirty="0"/>
-              <a:t>Filter </a:t>
+              <a:t>Add all</a:t>
             </a:r>
           </a:p>
         </p:txBody>
       </p:sp>
-      <p:pic>
-        <p:nvPicPr>
-          <p:cNvPr id="7" name="Picture 6"/>
-          <p:cNvPicPr>
-            <a:picLocks noChangeAspect="1"/>
-          </p:cNvPicPr>
-          <p:nvPr/>
-        </p:nvPicPr>
-        <p:blipFill>
-          <a:blip r:embed="rId13"/>
-          <a:stretch>
-            <a:fillRect/>
-          </a:stretch>
-        </p:blipFill>
-        <p:spPr>
-          <a:xfrm>
-            <a:off x="3253808" y="3341709"/>
-            <a:ext cx="8706761" cy="2809852"/>
-          </a:xfrm>
-          <a:prstGeom prst="rect">
-            <a:avLst/>
-          </a:prstGeom>
-        </p:spPr>
-      </p:pic>
-      <p:pic>
-        <p:nvPicPr>
-          <p:cNvPr id="8" name="Picture 7"/>
-          <p:cNvPicPr>
-            <a:picLocks noChangeAspect="1"/>
-          </p:cNvPicPr>
-          <p:nvPr/>
-        </p:nvPicPr>
-        <p:blipFill rotWithShape="1">
-          <a:blip r:embed="rId14"/>
-          <a:srcRect r="9276" b="-318"/>
-          <a:stretch/>
-        </p:blipFill>
-        <p:spPr>
-          <a:xfrm>
-            <a:off x="2945581" y="4012502"/>
-            <a:ext cx="336879" cy="2173261"/>
-          </a:xfrm>
-          <a:prstGeom prst="rect">
-            <a:avLst/>
-          </a:prstGeom>
-        </p:spPr>
-      </p:pic>
-      <p:pic>
-        <p:nvPicPr>
-          <p:cNvPr id="53" name="Picture 52">
-            <a:extLst>
-              <a:ext uri="{FF2B5EF4-FFF2-40B4-BE49-F238E27FC236}">
-                <a16:creationId xmlns:a16="http://schemas.microsoft.com/office/drawing/2014/main" id="{D61881A4-B9B7-EA4D-A8C2-F7D2F176BD1B}"/>
-              </a:ext>
-            </a:extLst>
-          </p:cNvPr>
-          <p:cNvPicPr>
-            <a:picLocks noChangeAspect="1"/>
-          </p:cNvPicPr>
-          <p:nvPr/>
-        </p:nvPicPr>
-        <p:blipFill rotWithShape="1">
-          <a:blip r:embed="rId13"/>
-          <a:srcRect l="11986" r="79135" b="83150"/>
-          <a:stretch/>
-        </p:blipFill>
-        <p:spPr>
-          <a:xfrm>
-            <a:off x="2945581" y="3344584"/>
-            <a:ext cx="342738" cy="667918"/>
-          </a:xfrm>
-          <a:prstGeom prst="rect">
-            <a:avLst/>
-          </a:prstGeom>
-        </p:spPr>
-      </p:pic>
-      <p:pic>
-        <p:nvPicPr>
-          <p:cNvPr id="3" name="Picture 2">
-            <a:extLst>
-              <a:ext uri="{FF2B5EF4-FFF2-40B4-BE49-F238E27FC236}">
-                <a16:creationId xmlns:a16="http://schemas.microsoft.com/office/drawing/2014/main" id="{70479DC5-6CE0-734B-B5A7-135785E432A2}"/>
-              </a:ext>
-            </a:extLst>
-          </p:cNvPr>
-          <p:cNvPicPr>
-            <a:picLocks noChangeAspect="1"/>
-          </p:cNvPicPr>
-          <p:nvPr/>
-        </p:nvPicPr>
-        <p:blipFill>
-          <a:blip r:embed="rId15"/>
-          <a:stretch>
-            <a:fillRect/>
-          </a:stretch>
-        </p:blipFill>
-        <p:spPr>
-          <a:xfrm>
-            <a:off x="3282460" y="1915226"/>
-            <a:ext cx="1570631" cy="566040"/>
-          </a:xfrm>
-          <a:prstGeom prst="rect">
-            <a:avLst/>
-          </a:prstGeom>
-        </p:spPr>
-      </p:pic>
     </p:spTree>
     <p:extLst>
       <p:ext uri="{BB962C8B-B14F-4D97-AF65-F5344CB8AC3E}">
@@ -15583,14 +15592,14 @@
           <a:lstStyle/>
           <a:p>
             <a:r>
-              <a:rPr lang="en-IN" sz="1646" dirty="0">
+              <a:rPr lang="en-IN" sz="1646" u="sng" dirty="0">
                 <a:solidFill>
                   <a:schemeClr val="bg2">
                     <a:lumMod val="50000"/>
                   </a:schemeClr>
                 </a:solidFill>
               </a:rPr>
-              <a:t>28/02/19</a:t>
+              <a:t>28/02/19 </a:t>
             </a:r>
           </a:p>
         </p:txBody>
@@ -15798,7 +15807,7 @@
           <a:lstStyle/>
           <a:p>
             <a:r>
-              <a:rPr lang="en-IN" sz="1646" dirty="0">
+              <a:rPr lang="en-IN" sz="1646" u="sng" dirty="0">
                 <a:solidFill>
                   <a:schemeClr val="bg2">
                     <a:lumMod val="50000"/>
@@ -16009,6 +16018,141 @@
           </a:prstGeom>
         </p:spPr>
       </p:pic>
+      <p:sp>
+        <p:nvSpPr>
+          <p:cNvPr id="3" name="TextBox 2">
+            <a:extLst>
+              <a:ext uri="{FF2B5EF4-FFF2-40B4-BE49-F238E27FC236}">
+                <a16:creationId xmlns:a16="http://schemas.microsoft.com/office/drawing/2014/main" id="{55699F39-74BD-0649-ACB4-3E8108DCB446}"/>
+              </a:ext>
+            </a:extLst>
+          </p:cNvPr>
+          <p:cNvSpPr txBox="1"/>
+          <p:nvPr/>
+        </p:nvSpPr>
+        <p:spPr>
+          <a:xfrm>
+            <a:off x="5146861" y="7099408"/>
+            <a:ext cx="2005677" cy="369332"/>
+          </a:xfrm>
+          <a:prstGeom prst="rect">
+            <a:avLst/>
+          </a:prstGeom>
+          <a:noFill/>
+        </p:spPr>
+        <p:txBody>
+          <a:bodyPr wrap="none" rtlCol="0">
+            <a:spAutoFit/>
+          </a:bodyPr>
+          <a:lstStyle/>
+          <a:p>
+            <a:r>
+              <a:rPr lang="en-US" dirty="0"/>
+              <a:t>//Common Module</a:t>
+            </a:r>
+          </a:p>
+        </p:txBody>
+      </p:sp>
+      <p:sp>
+        <p:nvSpPr>
+          <p:cNvPr id="61" name="TextBox 60">
+            <a:extLst>
+              <a:ext uri="{FF2B5EF4-FFF2-40B4-BE49-F238E27FC236}">
+                <a16:creationId xmlns:a16="http://schemas.microsoft.com/office/drawing/2014/main" id="{9595503B-F8E6-C54C-98D4-D2293C88D7DA}"/>
+              </a:ext>
+            </a:extLst>
+          </p:cNvPr>
+          <p:cNvSpPr txBox="1"/>
+          <p:nvPr/>
+        </p:nvSpPr>
+        <p:spPr>
+          <a:xfrm>
+            <a:off x="3422830" y="5636775"/>
+            <a:ext cx="1328697" cy="369332"/>
+          </a:xfrm>
+          <a:prstGeom prst="rect">
+            <a:avLst/>
+          </a:prstGeom>
+          <a:noFill/>
+        </p:spPr>
+        <p:txBody>
+          <a:bodyPr wrap="none" rtlCol="0">
+            <a:spAutoFit/>
+          </a:bodyPr>
+          <a:lstStyle/>
+          <a:p>
+            <a:pPr algn="ctr"/>
+            <a:r>
+              <a:rPr lang="en-US" dirty="0"/>
+              <a:t>Department</a:t>
+            </a:r>
+          </a:p>
+        </p:txBody>
+      </p:sp>
+      <p:sp>
+        <p:nvSpPr>
+          <p:cNvPr id="63" name="Rectangle: Rounded Corners 55">
+            <a:extLst>
+              <a:ext uri="{FF2B5EF4-FFF2-40B4-BE49-F238E27FC236}">
+                <a16:creationId xmlns:a16="http://schemas.microsoft.com/office/drawing/2014/main" id="{AB2E9D28-C0EC-9E4C-8F0E-013A5C6D717D}"/>
+              </a:ext>
+            </a:extLst>
+          </p:cNvPr>
+          <p:cNvSpPr/>
+          <p:nvPr/>
+        </p:nvSpPr>
+        <p:spPr>
+          <a:xfrm>
+            <a:off x="5114855" y="5621976"/>
+            <a:ext cx="3068078" cy="422168"/>
+          </a:xfrm>
+          <a:prstGeom prst="roundRect">
+            <a:avLst/>
+          </a:prstGeom>
+          <a:solidFill>
+            <a:schemeClr val="bg1"/>
+          </a:solidFill>
+          <a:ln>
+            <a:solidFill>
+              <a:schemeClr val="bg2">
+                <a:lumMod val="50000"/>
+              </a:schemeClr>
+            </a:solidFill>
+          </a:ln>
+        </p:spPr>
+        <p:style>
+          <a:lnRef idx="2">
+            <a:schemeClr val="accent1">
+              <a:shade val="50000"/>
+            </a:schemeClr>
+          </a:lnRef>
+          <a:fillRef idx="1">
+            <a:schemeClr val="accent1"/>
+          </a:fillRef>
+          <a:effectRef idx="0">
+            <a:schemeClr val="accent1"/>
+          </a:effectRef>
+          <a:fontRef idx="minor">
+            <a:schemeClr val="lt1"/>
+          </a:fontRef>
+        </p:style>
+        <p:txBody>
+          <a:bodyPr rtlCol="0" anchor="ctr"/>
+          <a:lstStyle/>
+          <a:p>
+            <a:r>
+              <a:rPr lang="en-IN" sz="1646" u="sng" dirty="0">
+                <a:solidFill>
+                  <a:schemeClr val="bg2">
+                    <a:lumMod val="50000"/>
+                  </a:schemeClr>
+                </a:solidFill>
+              </a:rPr>
+              <a:t>MANUFACTURING</a:t>
+            </a:r>
+          </a:p>
+        </p:txBody>
+      </p:sp>
     </p:spTree>
     <p:extLst>
       <p:ext uri="{BB962C8B-B14F-4D97-AF65-F5344CB8AC3E}">
@@ -25169,7 +25313,7 @@
         </p:nvSpPr>
         <p:spPr>
           <a:xfrm>
-            <a:off x="5996457" y="6741147"/>
+            <a:off x="4267068" y="5826682"/>
             <a:ext cx="1813374" cy="443272"/>
           </a:xfrm>
           <a:prstGeom prst="roundRect">
@@ -25210,35 +25354,11 @@
             <a:pPr algn="ctr"/>
             <a:r>
               <a:rPr lang="en-IN" sz="1646" dirty="0"/>
-              <a:t>Send SMS</a:t>
+              <a:t>Send  Email</a:t>
             </a:r>
           </a:p>
         </p:txBody>
       </p:sp>
-      <p:pic>
-        <p:nvPicPr>
-          <p:cNvPr id="3" name="Picture 2"/>
-          <p:cNvPicPr>
-            <a:picLocks noChangeAspect="1"/>
-          </p:cNvPicPr>
-          <p:nvPr/>
-        </p:nvPicPr>
-        <p:blipFill>
-          <a:blip r:embed="rId11"/>
-          <a:stretch>
-            <a:fillRect/>
-          </a:stretch>
-        </p:blipFill>
-        <p:spPr>
-          <a:xfrm>
-            <a:off x="4732150" y="5197676"/>
-            <a:ext cx="4341988" cy="1314450"/>
-          </a:xfrm>
-          <a:prstGeom prst="rect">
-            <a:avLst/>
-          </a:prstGeom>
-        </p:spPr>
-      </p:pic>
       <p:pic>
         <p:nvPicPr>
           <p:cNvPr id="56" name="Picture 55">
@@ -25329,7 +25449,7 @@
         </p:nvSpPr>
         <p:spPr>
           <a:xfrm>
-            <a:off x="8188659" y="6695126"/>
+            <a:off x="7162792" y="5843535"/>
             <a:ext cx="1813374" cy="443272"/>
           </a:xfrm>
           <a:prstGeom prst="roundRect">

</xml_diff>

<commit_message>
updated screen designs for Admin Modules
</commit_message>
<xml_diff>
--- a/Documentation/Screen Designs/Shanta Sanofi Screen Designs.pptx
+++ b/Documentation/Screen Designs/Shanta Sanofi Screen Designs.pptx
@@ -14126,14 +14126,11 @@
             <a:avLst/>
           </a:prstGeom>
           <a:solidFill>
-            <a:srgbClr val="00B0F0"/>
+            <a:srgbClr val="00A8AA"/>
           </a:solidFill>
           <a:ln>
             <a:solidFill>
-              <a:schemeClr val="accent1">
-                <a:lumMod val="60000"/>
-                <a:lumOff val="40000"/>
-              </a:schemeClr>
+              <a:srgbClr val="00A8AA"/>
             </a:solidFill>
           </a:ln>
         </p:spPr>
@@ -16306,14 +16303,11 @@
             <a:avLst/>
           </a:prstGeom>
           <a:solidFill>
-            <a:srgbClr val="00B0F0"/>
+            <a:srgbClr val="00A8AA"/>
           </a:solidFill>
           <a:ln>
             <a:solidFill>
-              <a:schemeClr val="accent1">
-                <a:lumMod val="60000"/>
-                <a:lumOff val="40000"/>
-              </a:schemeClr>
+              <a:srgbClr val="00A8AA"/>
             </a:solidFill>
           </a:ln>
         </p:spPr>
@@ -18310,10 +18304,7 @@
           </a:solidFill>
           <a:ln>
             <a:solidFill>
-              <a:schemeClr val="accent1">
-                <a:lumMod val="60000"/>
-                <a:lumOff val="40000"/>
-              </a:schemeClr>
+              <a:srgbClr val="00A8AA"/>
             </a:solidFill>
           </a:ln>
         </p:spPr>
@@ -19648,14 +19639,11 @@
             <a:avLst/>
           </a:prstGeom>
           <a:solidFill>
-            <a:srgbClr val="00B0F0"/>
+            <a:srgbClr val="00A8AA"/>
           </a:solidFill>
           <a:ln>
             <a:solidFill>
-              <a:schemeClr val="accent1">
-                <a:lumMod val="60000"/>
-                <a:lumOff val="40000"/>
-              </a:schemeClr>
+              <a:srgbClr val="00A8AA"/>
             </a:solidFill>
           </a:ln>
         </p:spPr>
@@ -21793,14 +21781,11 @@
             <a:avLst/>
           </a:prstGeom>
           <a:solidFill>
-            <a:srgbClr val="00B0F0"/>
+            <a:srgbClr val="00A8AA"/>
           </a:solidFill>
           <a:ln>
             <a:solidFill>
-              <a:schemeClr val="accent1">
-                <a:lumMod val="60000"/>
-                <a:lumOff val="40000"/>
-              </a:schemeClr>
+              <a:srgbClr val="00A8AA"/>
             </a:solidFill>
           </a:ln>
         </p:spPr>

</xml_diff>